<commit_message>
Update 12. Deep Generative Graph Models.pptx
</commit_message>
<xml_diff>
--- a/12. Deep Generative Graph Models.pptx
+++ b/12. Deep Generative Graph Models.pptx
@@ -5,7 +5,7 @@
     <p:sldMasterId id="2147483660" r:id="rId1"/>
   </p:sldMasterIdLst>
   <p:notesMasterIdLst>
-    <p:notesMasterId r:id="rId20"/>
+    <p:notesMasterId r:id="rId21"/>
   </p:notesMasterIdLst>
   <p:sldIdLst>
     <p:sldId id="257" r:id="rId2"/>
@@ -24,8 +24,9 @@
     <p:sldId id="581" r:id="rId15"/>
     <p:sldId id="580" r:id="rId16"/>
     <p:sldId id="583" r:id="rId17"/>
-    <p:sldId id="377" r:id="rId18"/>
-    <p:sldId id="300" r:id="rId19"/>
+    <p:sldId id="587" r:id="rId18"/>
+    <p:sldId id="377" r:id="rId19"/>
+    <p:sldId id="300" r:id="rId20"/>
   </p:sldIdLst>
   <p:sldSz cx="12192000" cy="6858000"/>
   <p:notesSz cx="6858000" cy="9144000"/>
@@ -145,6 +146,7 @@
             <p14:sldId id="581"/>
             <p14:sldId id="580"/>
             <p14:sldId id="583"/>
+            <p14:sldId id="587"/>
             <p14:sldId id="377"/>
             <p14:sldId id="300"/>
           </p14:sldIdLst>
@@ -240,7 +242,7 @@
           <a:p>
             <a:fld id="{1B6E2612-5213-4B6B-99A8-BAC5DC9C4481}" type="datetimeFigureOut">
               <a:rPr lang="en-US" smtClean="0"/>
-              <a:t>1/13/2021</a:t>
+              <a:t>1/15/2021</a:t>
             </a:fld>
             <a:endParaRPr lang="en-US"/>
           </a:p>
@@ -810,23 +812,6 @@
           <a:bodyPr/>
           <a:lstStyle/>
           <a:p>
-            <a:r>
-              <a:rPr lang="en-US" dirty="0"/>
-              <a:t>end-to-end deep generative model that is able to directly learn from the raw while finest-grained temporal networks (i.e., a collection of time-stamped edges). In particular, our framework is built based on a Transformer machine that learns the distribution of temporal random walks over the input data. To mimic the dynamic systems, </a:t>
-            </a:r>
-            <a:r>
-              <a:rPr lang="en-US" dirty="0" err="1"/>
-              <a:t>TagGen</a:t>
-            </a:r>
-            <a:r>
-              <a:rPr lang="en-US" dirty="0"/>
-              <a:t> is equipped with a novel context generation scheme that defines a family of local operations to perform addition and deletion over nodes and edges dynamically</a:t>
-            </a:r>
-          </a:p>
-          <a:p>
-            <a:endParaRPr lang="en-US" dirty="0"/>
-          </a:p>
-          <a:p>
             <a:pPr marL="0" marR="0" lvl="0" indent="0" algn="l" defTabSz="914400" rtl="0" eaLnBrk="1" fontAlgn="auto" latinLnBrk="0" hangingPunct="1">
               <a:lnSpc>
                 <a:spcPct val="100000"/>
@@ -845,10 +830,16 @@
               <a:defRPr/>
             </a:pPr>
             <a:r>
-              <a:rPr lang="en-US" b="0" dirty="0">
-                <a:effectLst/>
-              </a:rPr>
-              <a:t>[KDD 2020] A Data Driven Graph Generative Model for Temporal Interaction Networks</a:t>
+              <a:rPr lang="en-US" dirty="0"/>
+              <a:t>Li, Y., et al., (2018), Multi-objective de novo drug design with conditional graph generative model. </a:t>
+            </a:r>
+            <a:r>
+              <a:rPr lang="en-US" i="1" dirty="0"/>
+              <a:t>Journal of cheminformatics</a:t>
+            </a:r>
+            <a:r>
+              <a:rPr lang="en-US" dirty="0"/>
+              <a:t> 10.1 (2018): 33.</a:t>
             </a:r>
           </a:p>
           <a:p>
@@ -873,7 +864,7 @@
           <a:p>
             <a:fld id="{9271DED1-4C91-4561-A99B-E6676363E223}" type="slidenum">
               <a:rPr lang="en-US" smtClean="0"/>
-              <a:t>15</a:t>
+              <a:t>14</a:t>
             </a:fld>
             <a:endParaRPr lang="en-US"/>
           </a:p>
@@ -882,7 +873,7 @@
     </p:spTree>
     <p:extLst>
       <p:ext uri="{BB962C8B-B14F-4D97-AF65-F5344CB8AC3E}">
-        <p14:creationId xmlns:p14="http://schemas.microsoft.com/office/powerpoint/2010/main" val="3088757949"/>
+        <p14:creationId xmlns:p14="http://schemas.microsoft.com/office/powerpoint/2010/main" val="4264983013"/>
       </p:ext>
     </p:extLst>
   </p:cSld>
@@ -936,6 +927,23 @@
           <a:bodyPr/>
           <a:lstStyle/>
           <a:p>
+            <a:r>
+              <a:rPr lang="en-US" dirty="0"/>
+              <a:t>end-to-end deep generative model that is able to directly learn from the raw while finest-grained temporal networks (i.e., a collection of time-stamped edges). In particular, our framework is built based on a Transformer machine that learns the distribution of temporal random walks over the input data. To mimic the dynamic systems, </a:t>
+            </a:r>
+            <a:r>
+              <a:rPr lang="en-US" dirty="0" err="1"/>
+              <a:t>TagGen</a:t>
+            </a:r>
+            <a:r>
+              <a:rPr lang="en-US" dirty="0"/>
+              <a:t> is equipped with a novel context generation scheme that defines a family of local operations to perform addition and deletion over nodes and edges dynamically</a:t>
+            </a:r>
+          </a:p>
+          <a:p>
+            <a:endParaRPr lang="en-US" dirty="0"/>
+          </a:p>
+          <a:p>
             <a:pPr marL="0" marR="0" lvl="0" indent="0" algn="l" defTabSz="914400" rtl="0" eaLnBrk="1" fontAlgn="auto" latinLnBrk="0" hangingPunct="1">
               <a:lnSpc>
                 <a:spcPct val="100000"/>
@@ -954,6 +962,115 @@
               <a:defRPr/>
             </a:pPr>
             <a:r>
+              <a:rPr lang="en-US" b="0" dirty="0">
+                <a:effectLst/>
+              </a:rPr>
+              <a:t>[KDD 2020] A Data Driven Graph Generative Model for Temporal Interaction Networks</a:t>
+            </a:r>
+          </a:p>
+          <a:p>
+            <a:endParaRPr lang="en-US" dirty="0"/>
+          </a:p>
+        </p:txBody>
+      </p:sp>
+      <p:sp>
+        <p:nvSpPr>
+          <p:cNvPr id="4" name="Slide Number Placeholder 3"/>
+          <p:cNvSpPr>
+            <a:spLocks noGrp="1"/>
+          </p:cNvSpPr>
+          <p:nvPr>
+            <p:ph type="sldNum" sz="quarter" idx="5"/>
+          </p:nvPr>
+        </p:nvSpPr>
+        <p:spPr/>
+        <p:txBody>
+          <a:bodyPr/>
+          <a:lstStyle/>
+          <a:p>
+            <a:fld id="{9271DED1-4C91-4561-A99B-E6676363E223}" type="slidenum">
+              <a:rPr lang="en-US" smtClean="0"/>
+              <a:t>15</a:t>
+            </a:fld>
+            <a:endParaRPr lang="en-US"/>
+          </a:p>
+        </p:txBody>
+      </p:sp>
+    </p:spTree>
+    <p:extLst>
+      <p:ext uri="{BB962C8B-B14F-4D97-AF65-F5344CB8AC3E}">
+        <p14:creationId xmlns:p14="http://schemas.microsoft.com/office/powerpoint/2010/main" val="3088757949"/>
+      </p:ext>
+    </p:extLst>
+  </p:cSld>
+  <p:clrMapOvr>
+    <a:masterClrMapping/>
+  </p:clrMapOvr>
+</p:notes>
+</file>
+
+<file path=ppt/notesSlides/notesSlide12.xml><?xml version="1.0" encoding="utf-8"?>
+<p:notes xmlns:a="http://schemas.openxmlformats.org/drawingml/2006/main" xmlns:r="http://schemas.openxmlformats.org/officeDocument/2006/relationships" xmlns:p="http://schemas.openxmlformats.org/presentationml/2006/main">
+  <p:cSld>
+    <p:spTree>
+      <p:nvGrpSpPr>
+        <p:cNvPr id="1" name=""/>
+        <p:cNvGrpSpPr/>
+        <p:nvPr/>
+      </p:nvGrpSpPr>
+      <p:grpSpPr>
+        <a:xfrm>
+          <a:off x="0" y="0"/>
+          <a:ext cx="0" cy="0"/>
+          <a:chOff x="0" y="0"/>
+          <a:chExt cx="0" cy="0"/>
+        </a:xfrm>
+      </p:grpSpPr>
+      <p:sp>
+        <p:nvSpPr>
+          <p:cNvPr id="2" name="Slide Image Placeholder 1"/>
+          <p:cNvSpPr>
+            <a:spLocks noGrp="1" noRot="1" noChangeAspect="1"/>
+          </p:cNvSpPr>
+          <p:nvPr>
+            <p:ph type="sldImg"/>
+          </p:nvPr>
+        </p:nvSpPr>
+        <p:spPr/>
+      </p:sp>
+      <p:sp>
+        <p:nvSpPr>
+          <p:cNvPr id="3" name="Notes Placeholder 2"/>
+          <p:cNvSpPr>
+            <a:spLocks noGrp="1"/>
+          </p:cNvSpPr>
+          <p:nvPr>
+            <p:ph type="body" idx="1"/>
+          </p:nvPr>
+        </p:nvSpPr>
+        <p:spPr/>
+        <p:txBody>
+          <a:bodyPr/>
+          <a:lstStyle/>
+          <a:p>
+            <a:pPr marL="0" marR="0" lvl="0" indent="0" algn="l" defTabSz="914400" rtl="0" eaLnBrk="1" fontAlgn="auto" latinLnBrk="0" hangingPunct="1">
+              <a:lnSpc>
+                <a:spcPct val="100000"/>
+              </a:lnSpc>
+              <a:spcBef>
+                <a:spcPts val="0"/>
+              </a:spcBef>
+              <a:spcAft>
+                <a:spcPts val="0"/>
+              </a:spcAft>
+              <a:buClrTx/>
+              <a:buSzTx/>
+              <a:buFontTx/>
+              <a:buNone/>
+              <a:tabLst/>
+              <a:defRPr/>
+            </a:pPr>
+            <a:r>
               <a:rPr lang="en-US" b="1" i="0" dirty="0">
                 <a:solidFill>
                   <a:srgbClr val="333333"/>
@@ -999,6 +1116,90 @@
     <p:extLst>
       <p:ext uri="{BB962C8B-B14F-4D97-AF65-F5344CB8AC3E}">
         <p14:creationId xmlns:p14="http://schemas.microsoft.com/office/powerpoint/2010/main" val="3444638390"/>
+      </p:ext>
+    </p:extLst>
+  </p:cSld>
+  <p:clrMapOvr>
+    <a:masterClrMapping/>
+  </p:clrMapOvr>
+</p:notes>
+</file>
+
+<file path=ppt/notesSlides/notesSlide13.xml><?xml version="1.0" encoding="utf-8"?>
+<p:notes xmlns:a="http://schemas.openxmlformats.org/drawingml/2006/main" xmlns:r="http://schemas.openxmlformats.org/officeDocument/2006/relationships" xmlns:p="http://schemas.openxmlformats.org/presentationml/2006/main">
+  <p:cSld>
+    <p:spTree>
+      <p:nvGrpSpPr>
+        <p:cNvPr id="1" name=""/>
+        <p:cNvGrpSpPr/>
+        <p:nvPr/>
+      </p:nvGrpSpPr>
+      <p:grpSpPr>
+        <a:xfrm>
+          <a:off x="0" y="0"/>
+          <a:ext cx="0" cy="0"/>
+          <a:chOff x="0" y="0"/>
+          <a:chExt cx="0" cy="0"/>
+        </a:xfrm>
+      </p:grpSpPr>
+      <p:sp>
+        <p:nvSpPr>
+          <p:cNvPr id="2" name="Slide Image Placeholder 1"/>
+          <p:cNvSpPr>
+            <a:spLocks noGrp="1" noRot="1" noChangeAspect="1"/>
+          </p:cNvSpPr>
+          <p:nvPr>
+            <p:ph type="sldImg"/>
+          </p:nvPr>
+        </p:nvSpPr>
+        <p:spPr/>
+      </p:sp>
+      <p:sp>
+        <p:nvSpPr>
+          <p:cNvPr id="3" name="Notes Placeholder 2"/>
+          <p:cNvSpPr>
+            <a:spLocks noGrp="1"/>
+          </p:cNvSpPr>
+          <p:nvPr>
+            <p:ph type="body" idx="1"/>
+          </p:nvPr>
+        </p:nvSpPr>
+        <p:spPr/>
+        <p:txBody>
+          <a:bodyPr/>
+          <a:lstStyle/>
+          <a:p>
+            <a:endParaRPr lang="en-US" dirty="0"/>
+          </a:p>
+        </p:txBody>
+      </p:sp>
+      <p:sp>
+        <p:nvSpPr>
+          <p:cNvPr id="4" name="Slide Number Placeholder 3"/>
+          <p:cNvSpPr>
+            <a:spLocks noGrp="1"/>
+          </p:cNvSpPr>
+          <p:nvPr>
+            <p:ph type="sldNum" sz="quarter" idx="5"/>
+          </p:nvPr>
+        </p:nvSpPr>
+        <p:spPr/>
+        <p:txBody>
+          <a:bodyPr/>
+          <a:lstStyle/>
+          <a:p>
+            <a:fld id="{9271DED1-4C91-4561-A99B-E6676363E223}" type="slidenum">
+              <a:rPr lang="en-US" smtClean="0"/>
+              <a:t>17</a:t>
+            </a:fld>
+            <a:endParaRPr lang="en-US"/>
+          </a:p>
+        </p:txBody>
+      </p:sp>
+    </p:spTree>
+    <p:extLst>
+      <p:ext uri="{BB962C8B-B14F-4D97-AF65-F5344CB8AC3E}">
+        <p14:creationId xmlns:p14="http://schemas.microsoft.com/office/powerpoint/2010/main" val="2753775852"/>
       </p:ext>
     </p:extLst>
   </p:cSld>
@@ -1071,19 +1272,23 @@
             </a:pPr>
             <a:r>
               <a:rPr lang="en-US" dirty="0"/>
-              <a:t>[Wang &amp; Tax 2016] Wang, Feng, and David MJ Tax. "Survey on the attention based RNN model and its applications in computer vision." </a:t>
-            </a:r>
-            <a:r>
-              <a:rPr lang="en-US" i="1" dirty="0" err="1"/>
-              <a:t>arXiv</a:t>
+              <a:t>Van Den Oord, A., &amp; </a:t>
+            </a:r>
+            <a:r>
+              <a:rPr lang="en-US" dirty="0" err="1"/>
+              <a:t>Vinyals</a:t>
+            </a:r>
+            <a:r>
+              <a:rPr lang="en-US" dirty="0"/>
+              <a:t>, O. (2017). Neural discrete representation learning. In </a:t>
             </a:r>
             <a:r>
               <a:rPr lang="en-US" i="1" dirty="0"/>
-              <a:t> preprint arXiv:1601.06823</a:t>
+              <a:t>Advances in Neural Information Processing Systems</a:t>
             </a:r>
             <a:r>
               <a:rPr lang="en-US" dirty="0"/>
-              <a:t> (2016).</a:t>
+              <a:t> (pp. 6306-6315).</a:t>
             </a:r>
           </a:p>
           <a:p>
@@ -1104,37 +1309,21 @@
               <a:tabLst/>
               <a:defRPr/>
             </a:pPr>
-            <a:endParaRPr lang="en-US" dirty="0"/>
-          </a:p>
-          <a:p>
-            <a:pPr marL="0" marR="0" lvl="0" indent="0" algn="l" defTabSz="914400" rtl="0" eaLnBrk="1" fontAlgn="auto" latinLnBrk="0" hangingPunct="1">
-              <a:lnSpc>
-                <a:spcPct val="100000"/>
-              </a:lnSpc>
-              <a:spcBef>
-                <a:spcPts val="0"/>
-              </a:spcBef>
-              <a:spcAft>
-                <a:spcPts val="0"/>
-              </a:spcAft>
-              <a:buClrTx/>
-              <a:buSzTx/>
-              <a:buFontTx/>
-              <a:buNone/>
-              <a:tabLst/>
-              <a:defRPr/>
-            </a:pPr>
+            <a:r>
+              <a:rPr lang="en-US" dirty="0" err="1"/>
+              <a:t>Doersch</a:t>
+            </a:r>
             <a:r>
               <a:rPr lang="en-US" dirty="0"/>
-              <a:t>[Luong et al. 2015] Luong, Minh-Thang, </a:t>
+              <a:t>, Carl. "Tutorial on variational autoencoders. </a:t>
             </a:r>
             <a:r>
               <a:rPr lang="en-US" dirty="0" err="1"/>
-              <a:t>Hieu</a:t>
+              <a:t>arXiv</a:t>
             </a:r>
             <a:r>
               <a:rPr lang="en-US" dirty="0"/>
-              <a:t> Pham, and Christopher D. Manning. "Effective approaches to attention-based neural machine translation." </a:t>
+              <a:t> 2016." </a:t>
             </a:r>
             <a:r>
               <a:rPr lang="en-US" i="1" dirty="0" err="1"/>
@@ -1142,251 +1331,15 @@
             </a:r>
             <a:r>
               <a:rPr lang="en-US" i="1" dirty="0"/>
-              <a:t> preprint arXiv:1508.04025</a:t>
+              <a:t> preprint arXiv:1606.05908</a:t>
             </a:r>
             <a:r>
               <a:rPr lang="en-US" dirty="0"/>
-              <a:t> (2015).</a:t>
-            </a:r>
-          </a:p>
-          <a:p>
-            <a:pPr marL="0" marR="0" lvl="0" indent="0" algn="l" defTabSz="914400" rtl="0" eaLnBrk="1" fontAlgn="auto" latinLnBrk="0" hangingPunct="1">
-              <a:lnSpc>
-                <a:spcPct val="100000"/>
-              </a:lnSpc>
-              <a:spcBef>
-                <a:spcPts val="0"/>
-              </a:spcBef>
-              <a:spcAft>
-                <a:spcPts val="0"/>
-              </a:spcAft>
-              <a:buClrTx/>
-              <a:buSzTx/>
-              <a:buFontTx/>
-              <a:buNone/>
-              <a:tabLst/>
-              <a:defRPr/>
-            </a:pPr>
+              <a:t> (2016).</a:t>
+            </a:r>
+          </a:p>
+          <a:p>
             <a:endParaRPr lang="en-US" dirty="0"/>
-          </a:p>
-          <a:p>
-            <a:pPr marL="0" marR="0" lvl="0" indent="0" algn="l" defTabSz="914400" rtl="0" eaLnBrk="1" fontAlgn="auto" latinLnBrk="0" hangingPunct="1">
-              <a:lnSpc>
-                <a:spcPct val="100000"/>
-              </a:lnSpc>
-              <a:spcBef>
-                <a:spcPts val="0"/>
-              </a:spcBef>
-              <a:spcAft>
-                <a:spcPts val="0"/>
-              </a:spcAft>
-              <a:buClrTx/>
-              <a:buSzTx/>
-              <a:buFontTx/>
-              <a:buNone/>
-              <a:tabLst/>
-              <a:defRPr/>
-            </a:pPr>
-            <a:r>
-              <a:rPr lang="en-US" dirty="0"/>
-              <a:t>[Vaswani et al. 2017] Vaswani, A., </a:t>
-            </a:r>
-            <a:r>
-              <a:rPr lang="en-US" dirty="0" err="1"/>
-              <a:t>Shazeer</a:t>
-            </a:r>
-            <a:r>
-              <a:rPr lang="en-US" dirty="0"/>
-              <a:t>, N., Parmar, N., </a:t>
-            </a:r>
-            <a:r>
-              <a:rPr lang="en-US" dirty="0" err="1"/>
-              <a:t>Uszkoreit</a:t>
-            </a:r>
-            <a:r>
-              <a:rPr lang="en-US" dirty="0"/>
-              <a:t>, J., Jones, L., Gomez, A. N., ... &amp; </a:t>
-            </a:r>
-            <a:r>
-              <a:rPr lang="en-US" dirty="0" err="1"/>
-              <a:t>Polosukhin</a:t>
-            </a:r>
-            <a:r>
-              <a:rPr lang="en-US" dirty="0"/>
-              <a:t>, I. (2017). Attention is all you need. </a:t>
-            </a:r>
-            <a:r>
-              <a:rPr lang="en-US" i="1" dirty="0"/>
-              <a:t>Advances in neural information processing systems</a:t>
-            </a:r>
-            <a:r>
-              <a:rPr lang="en-US" dirty="0"/>
-              <a:t>, </a:t>
-            </a:r>
-            <a:r>
-              <a:rPr lang="en-US" i="1" dirty="0"/>
-              <a:t>30</a:t>
-            </a:r>
-            <a:r>
-              <a:rPr lang="en-US" dirty="0"/>
-              <a:t>, 5998-6008.</a:t>
-            </a:r>
-          </a:p>
-          <a:p>
-            <a:pPr marL="0" marR="0" lvl="0" indent="0" algn="l" defTabSz="914400" rtl="0" eaLnBrk="1" fontAlgn="auto" latinLnBrk="0" hangingPunct="1">
-              <a:lnSpc>
-                <a:spcPct val="100000"/>
-              </a:lnSpc>
-              <a:spcBef>
-                <a:spcPts val="0"/>
-              </a:spcBef>
-              <a:spcAft>
-                <a:spcPts val="0"/>
-              </a:spcAft>
-              <a:buClrTx/>
-              <a:buSzTx/>
-              <a:buFontTx/>
-              <a:buNone/>
-              <a:tabLst/>
-              <a:defRPr/>
-            </a:pPr>
-            <a:endParaRPr lang="en-US" dirty="0"/>
-          </a:p>
-          <a:p>
-            <a:r>
-              <a:rPr lang="en-US" dirty="0" err="1"/>
-              <a:t>Bahdanau</a:t>
-            </a:r>
-            <a:r>
-              <a:rPr lang="en-US" dirty="0"/>
-              <a:t>, </a:t>
-            </a:r>
-            <a:r>
-              <a:rPr lang="en-US" dirty="0" err="1"/>
-              <a:t>Dzmitry</a:t>
-            </a:r>
-            <a:r>
-              <a:rPr lang="en-US" dirty="0"/>
-              <a:t>, </a:t>
-            </a:r>
-            <a:r>
-              <a:rPr lang="en-US" dirty="0" err="1"/>
-              <a:t>Kyunghyun</a:t>
-            </a:r>
-            <a:r>
-              <a:rPr lang="en-US" dirty="0"/>
-              <a:t> Cho, and </a:t>
-            </a:r>
-            <a:r>
-              <a:rPr lang="en-US" dirty="0" err="1"/>
-              <a:t>Yoshua</a:t>
-            </a:r>
-            <a:r>
-              <a:rPr lang="en-US" dirty="0"/>
-              <a:t> </a:t>
-            </a:r>
-            <a:r>
-              <a:rPr lang="en-US" dirty="0" err="1"/>
-              <a:t>Bengio</a:t>
-            </a:r>
-            <a:r>
-              <a:rPr lang="en-US" dirty="0"/>
-              <a:t>. "Neural machine translation by jointly learning to align and translate." </a:t>
-            </a:r>
-            <a:r>
-              <a:rPr lang="en-US" i="1" dirty="0" err="1"/>
-              <a:t>arXiv</a:t>
-            </a:r>
-            <a:r>
-              <a:rPr lang="en-US" i="1" dirty="0"/>
-              <a:t> preprint arXiv:1409.0473</a:t>
-            </a:r>
-            <a:r>
-              <a:rPr lang="en-US" dirty="0"/>
-              <a:t> (2014).</a:t>
-            </a:r>
-          </a:p>
-          <a:p>
-            <a:r>
-              <a:rPr lang="en-US" dirty="0"/>
-              <a:t>Xu, Kelvin, et al. "Show, attend and tell: Neural image caption generation with visual attention." </a:t>
-            </a:r>
-            <a:r>
-              <a:rPr lang="en-US" i="1" dirty="0"/>
-              <a:t>International conference on machine learning</a:t>
-            </a:r>
-            <a:r>
-              <a:rPr lang="en-US" dirty="0"/>
-              <a:t>. 2015.</a:t>
-            </a:r>
-          </a:p>
-          <a:p>
-            <a:pPr marL="0" marR="0" lvl="0" indent="0" algn="l" defTabSz="914400" rtl="0" eaLnBrk="1" fontAlgn="auto" latinLnBrk="0" hangingPunct="1">
-              <a:lnSpc>
-                <a:spcPct val="100000"/>
-              </a:lnSpc>
-              <a:spcBef>
-                <a:spcPts val="0"/>
-              </a:spcBef>
-              <a:spcAft>
-                <a:spcPts val="0"/>
-              </a:spcAft>
-              <a:buClrTx/>
-              <a:buSzTx/>
-              <a:buFontTx/>
-              <a:buNone/>
-              <a:tabLst/>
-              <a:defRPr/>
-            </a:pPr>
-            <a:endParaRPr lang="en-US" dirty="0"/>
-          </a:p>
-          <a:p>
-            <a:endParaRPr lang="en-US" dirty="0"/>
-          </a:p>
-          <a:p>
-            <a:r>
-              <a:rPr lang="en-US" dirty="0"/>
-              <a:t>The research described in the paper </a:t>
-            </a:r>
-            <a:r>
-              <a:rPr lang="en-US" dirty="0">
-                <a:hlinkClick r:id="rId3"/>
-              </a:rPr>
-              <a:t>Graph Convolutional Network (GCN)</a:t>
-            </a:r>
-            <a:r>
-              <a:rPr lang="en-US" dirty="0"/>
-              <a:t>, indicates that combining local graph structure and node-level features produces good performance on node classification tasks. However, the way GCN aggregates is structure-dependent, which can hurt its generalizability.</a:t>
-            </a:r>
-          </a:p>
-          <a:p>
-            <a:endParaRPr lang="en-US" dirty="0"/>
-          </a:p>
-          <a:p>
-            <a:r>
-              <a:rPr lang="en-US" dirty="0"/>
-              <a:t>One workaround is to simply average over all neighbor node features as described in the research paper </a:t>
-            </a:r>
-            <a:r>
-              <a:rPr lang="en-US" dirty="0" err="1">
-                <a:hlinkClick r:id="rId4"/>
-              </a:rPr>
-              <a:t>GraphSAGE</a:t>
-            </a:r>
-            <a:r>
-              <a:rPr lang="en-US" dirty="0"/>
-              <a:t>. However, </a:t>
-            </a:r>
-            <a:r>
-              <a:rPr lang="en-US" dirty="0">
-                <a:hlinkClick r:id="rId5"/>
-              </a:rPr>
-              <a:t>Graph Attention Network</a:t>
-            </a:r>
-            <a:r>
-              <a:rPr lang="en-US" dirty="0"/>
-              <a:t> proposes a different type of aggregation. GAN uses weighting neighbor features with feature dependent and structure-free normalization, in the style of attention.</a:t>
-            </a:r>
           </a:p>
         </p:txBody>
       </p:sp>
@@ -1407,7 +1360,7 @@
           <a:p>
             <a:fld id="{9271DED1-4C91-4561-A99B-E6676363E223}" type="slidenum">
               <a:rPr lang="en-US" smtClean="0"/>
-              <a:t>4</a:t>
+              <a:t>3</a:t>
             </a:fld>
             <a:endParaRPr lang="en-US"/>
           </a:p>
@@ -1416,7 +1369,7 @@
     </p:spTree>
     <p:extLst>
       <p:ext uri="{BB962C8B-B14F-4D97-AF65-F5344CB8AC3E}">
-        <p14:creationId xmlns:p14="http://schemas.microsoft.com/office/powerpoint/2010/main" val="2807577603"/>
+        <p14:creationId xmlns:p14="http://schemas.microsoft.com/office/powerpoint/2010/main" val="847139690"/>
       </p:ext>
     </p:extLst>
   </p:cSld>
@@ -1470,9 +1423,340 @@
           <a:bodyPr/>
           <a:lstStyle/>
           <a:p>
+            <a:pPr marL="0" marR="0" lvl="0" indent="0" algn="l" defTabSz="914400" rtl="0" eaLnBrk="1" fontAlgn="auto" latinLnBrk="0" hangingPunct="1">
+              <a:lnSpc>
+                <a:spcPct val="100000"/>
+              </a:lnSpc>
+              <a:spcBef>
+                <a:spcPts val="0"/>
+              </a:spcBef>
+              <a:spcAft>
+                <a:spcPts val="0"/>
+              </a:spcAft>
+              <a:buClrTx/>
+              <a:buSzTx/>
+              <a:buFontTx/>
+              <a:buNone/>
+              <a:tabLst/>
+              <a:defRPr/>
+            </a:pPr>
             <a:r>
               <a:rPr lang="en-US" dirty="0"/>
-              <a:t>Still exponential in the number of parents, but we do not expect too many parents. The reason being that we do not expect that everything is conditional on everything.</a:t>
+              <a:t>[Wang &amp; Tax 2016] Wang, Feng, and David MJ Tax. "Survey on the attention based RNN model and its applications in computer vision." </a:t>
+            </a:r>
+            <a:r>
+              <a:rPr lang="en-US" i="1" dirty="0" err="1"/>
+              <a:t>arXiv</a:t>
+            </a:r>
+            <a:r>
+              <a:rPr lang="en-US" i="1" dirty="0"/>
+              <a:t> preprint arXiv:1601.06823</a:t>
+            </a:r>
+            <a:r>
+              <a:rPr lang="en-US" dirty="0"/>
+              <a:t> (2016).</a:t>
+            </a:r>
+          </a:p>
+          <a:p>
+            <a:pPr marL="0" marR="0" lvl="0" indent="0" algn="l" defTabSz="914400" rtl="0" eaLnBrk="1" fontAlgn="auto" latinLnBrk="0" hangingPunct="1">
+              <a:lnSpc>
+                <a:spcPct val="100000"/>
+              </a:lnSpc>
+              <a:spcBef>
+                <a:spcPts val="0"/>
+              </a:spcBef>
+              <a:spcAft>
+                <a:spcPts val="0"/>
+              </a:spcAft>
+              <a:buClrTx/>
+              <a:buSzTx/>
+              <a:buFontTx/>
+              <a:buNone/>
+              <a:tabLst/>
+              <a:defRPr/>
+            </a:pPr>
+            <a:endParaRPr lang="en-US" dirty="0"/>
+          </a:p>
+          <a:p>
+            <a:pPr marL="0" marR="0" lvl="0" indent="0" algn="l" defTabSz="914400" rtl="0" eaLnBrk="1" fontAlgn="auto" latinLnBrk="0" hangingPunct="1">
+              <a:lnSpc>
+                <a:spcPct val="100000"/>
+              </a:lnSpc>
+              <a:spcBef>
+                <a:spcPts val="0"/>
+              </a:spcBef>
+              <a:spcAft>
+                <a:spcPts val="0"/>
+              </a:spcAft>
+              <a:buClrTx/>
+              <a:buSzTx/>
+              <a:buFontTx/>
+              <a:buNone/>
+              <a:tabLst/>
+              <a:defRPr/>
+            </a:pPr>
+            <a:r>
+              <a:rPr lang="en-US" dirty="0"/>
+              <a:t>[Luong et al. 2015] Luong, Minh-Thang, </a:t>
+            </a:r>
+            <a:r>
+              <a:rPr lang="en-US" dirty="0" err="1"/>
+              <a:t>Hieu</a:t>
+            </a:r>
+            <a:r>
+              <a:rPr lang="en-US" dirty="0"/>
+              <a:t> Pham, and Christopher D. Manning. "Effective approaches to attention-based neural machine translation." </a:t>
+            </a:r>
+            <a:r>
+              <a:rPr lang="en-US" i="1" dirty="0" err="1"/>
+              <a:t>arXiv</a:t>
+            </a:r>
+            <a:r>
+              <a:rPr lang="en-US" i="1" dirty="0"/>
+              <a:t> preprint arXiv:1508.04025</a:t>
+            </a:r>
+            <a:r>
+              <a:rPr lang="en-US" dirty="0"/>
+              <a:t> (2015).</a:t>
+            </a:r>
+          </a:p>
+          <a:p>
+            <a:pPr marL="0" marR="0" lvl="0" indent="0" algn="l" defTabSz="914400" rtl="0" eaLnBrk="1" fontAlgn="auto" latinLnBrk="0" hangingPunct="1">
+              <a:lnSpc>
+                <a:spcPct val="100000"/>
+              </a:lnSpc>
+              <a:spcBef>
+                <a:spcPts val="0"/>
+              </a:spcBef>
+              <a:spcAft>
+                <a:spcPts val="0"/>
+              </a:spcAft>
+              <a:buClrTx/>
+              <a:buSzTx/>
+              <a:buFontTx/>
+              <a:buNone/>
+              <a:tabLst/>
+              <a:defRPr/>
+            </a:pPr>
+            <a:endParaRPr lang="en-US" dirty="0"/>
+          </a:p>
+          <a:p>
+            <a:pPr marL="0" marR="0" lvl="0" indent="0" algn="l" defTabSz="914400" rtl="0" eaLnBrk="1" fontAlgn="auto" latinLnBrk="0" hangingPunct="1">
+              <a:lnSpc>
+                <a:spcPct val="100000"/>
+              </a:lnSpc>
+              <a:spcBef>
+                <a:spcPts val="0"/>
+              </a:spcBef>
+              <a:spcAft>
+                <a:spcPts val="0"/>
+              </a:spcAft>
+              <a:buClrTx/>
+              <a:buSzTx/>
+              <a:buFontTx/>
+              <a:buNone/>
+              <a:tabLst/>
+              <a:defRPr/>
+            </a:pPr>
+            <a:r>
+              <a:rPr lang="en-US" dirty="0"/>
+              <a:t>[Vaswani et al. 2017] Vaswani, A., </a:t>
+            </a:r>
+            <a:r>
+              <a:rPr lang="en-US" dirty="0" err="1"/>
+              <a:t>Shazeer</a:t>
+            </a:r>
+            <a:r>
+              <a:rPr lang="en-US" dirty="0"/>
+              <a:t>, N., Parmar, N., </a:t>
+            </a:r>
+            <a:r>
+              <a:rPr lang="en-US" dirty="0" err="1"/>
+              <a:t>Uszkoreit</a:t>
+            </a:r>
+            <a:r>
+              <a:rPr lang="en-US" dirty="0"/>
+              <a:t>, J., Jones, L., Gomez, A. N., ... &amp; </a:t>
+            </a:r>
+            <a:r>
+              <a:rPr lang="en-US" dirty="0" err="1"/>
+              <a:t>Polosukhin</a:t>
+            </a:r>
+            <a:r>
+              <a:rPr lang="en-US" dirty="0"/>
+              <a:t>, I. (2017). Attention is all you need. </a:t>
+            </a:r>
+            <a:r>
+              <a:rPr lang="en-US" i="1" dirty="0"/>
+              <a:t>Advances in neural information processing systems</a:t>
+            </a:r>
+            <a:r>
+              <a:rPr lang="en-US" dirty="0"/>
+              <a:t>, </a:t>
+            </a:r>
+            <a:r>
+              <a:rPr lang="en-US" i="1" dirty="0"/>
+              <a:t>30</a:t>
+            </a:r>
+            <a:r>
+              <a:rPr lang="en-US" dirty="0"/>
+              <a:t>, 5998-6008.</a:t>
+            </a:r>
+          </a:p>
+          <a:p>
+            <a:pPr marL="0" marR="0" lvl="0" indent="0" algn="l" defTabSz="914400" rtl="0" eaLnBrk="1" fontAlgn="auto" latinLnBrk="0" hangingPunct="1">
+              <a:lnSpc>
+                <a:spcPct val="100000"/>
+              </a:lnSpc>
+              <a:spcBef>
+                <a:spcPts val="0"/>
+              </a:spcBef>
+              <a:spcAft>
+                <a:spcPts val="0"/>
+              </a:spcAft>
+              <a:buClrTx/>
+              <a:buSzTx/>
+              <a:buFontTx/>
+              <a:buNone/>
+              <a:tabLst/>
+              <a:defRPr/>
+            </a:pPr>
+            <a:endParaRPr lang="en-US" dirty="0"/>
+          </a:p>
+          <a:p>
+            <a:r>
+              <a:rPr lang="en-US" dirty="0" err="1"/>
+              <a:t>Bahdanau</a:t>
+            </a:r>
+            <a:r>
+              <a:rPr lang="en-US" dirty="0"/>
+              <a:t>, </a:t>
+            </a:r>
+            <a:r>
+              <a:rPr lang="en-US" dirty="0" err="1"/>
+              <a:t>Dzmitry</a:t>
+            </a:r>
+            <a:r>
+              <a:rPr lang="en-US" dirty="0"/>
+              <a:t>, </a:t>
+            </a:r>
+            <a:r>
+              <a:rPr lang="en-US" dirty="0" err="1"/>
+              <a:t>Kyunghyun</a:t>
+            </a:r>
+            <a:r>
+              <a:rPr lang="en-US" dirty="0"/>
+              <a:t> Cho, and </a:t>
+            </a:r>
+            <a:r>
+              <a:rPr lang="en-US" dirty="0" err="1"/>
+              <a:t>Yoshua</a:t>
+            </a:r>
+            <a:r>
+              <a:rPr lang="en-US" dirty="0"/>
+              <a:t> </a:t>
+            </a:r>
+            <a:r>
+              <a:rPr lang="en-US" dirty="0" err="1"/>
+              <a:t>Bengio</a:t>
+            </a:r>
+            <a:r>
+              <a:rPr lang="en-US" dirty="0"/>
+              <a:t>. "Neural machine translation by jointly learning to align and translate." </a:t>
+            </a:r>
+            <a:r>
+              <a:rPr lang="en-US" i="1" dirty="0" err="1"/>
+              <a:t>arXiv</a:t>
+            </a:r>
+            <a:r>
+              <a:rPr lang="en-US" i="1" dirty="0"/>
+              <a:t> preprint arXiv:1409.0473</a:t>
+            </a:r>
+            <a:r>
+              <a:rPr lang="en-US" dirty="0"/>
+              <a:t> (2014).</a:t>
+            </a:r>
+          </a:p>
+          <a:p>
+            <a:r>
+              <a:rPr lang="en-US" dirty="0"/>
+              <a:t>Xu, Kelvin, et al. "Show, attend and tell: Neural image caption generation with visual attention." </a:t>
+            </a:r>
+            <a:r>
+              <a:rPr lang="en-US" i="1" dirty="0"/>
+              <a:t>International conference on machine learning</a:t>
+            </a:r>
+            <a:r>
+              <a:rPr lang="en-US" dirty="0"/>
+              <a:t>. 2015.</a:t>
+            </a:r>
+          </a:p>
+          <a:p>
+            <a:pPr marL="0" marR="0" lvl="0" indent="0" algn="l" defTabSz="914400" rtl="0" eaLnBrk="1" fontAlgn="auto" latinLnBrk="0" hangingPunct="1">
+              <a:lnSpc>
+                <a:spcPct val="100000"/>
+              </a:lnSpc>
+              <a:spcBef>
+                <a:spcPts val="0"/>
+              </a:spcBef>
+              <a:spcAft>
+                <a:spcPts val="0"/>
+              </a:spcAft>
+              <a:buClrTx/>
+              <a:buSzTx/>
+              <a:buFontTx/>
+              <a:buNone/>
+              <a:tabLst/>
+              <a:defRPr/>
+            </a:pPr>
+            <a:endParaRPr lang="en-US" dirty="0"/>
+          </a:p>
+          <a:p>
+            <a:endParaRPr lang="en-US" dirty="0"/>
+          </a:p>
+          <a:p>
+            <a:r>
+              <a:rPr lang="en-US" dirty="0"/>
+              <a:t>The research described in the paper </a:t>
+            </a:r>
+            <a:r>
+              <a:rPr lang="en-US" dirty="0">
+                <a:hlinkClick r:id="rId3"/>
+              </a:rPr>
+              <a:t>Graph Convolutional Network (GCN)</a:t>
+            </a:r>
+            <a:r>
+              <a:rPr lang="en-US" dirty="0"/>
+              <a:t>, indicates that combining local graph structure and node-level features produces good performance on node classification tasks. However, the way GCN aggregates is structure-dependent, which can hurt its generalizability.</a:t>
+            </a:r>
+          </a:p>
+          <a:p>
+            <a:endParaRPr lang="en-US" dirty="0"/>
+          </a:p>
+          <a:p>
+            <a:r>
+              <a:rPr lang="en-US" dirty="0"/>
+              <a:t>One workaround is to simply average over all neighbor node features as described in the research paper </a:t>
+            </a:r>
+            <a:r>
+              <a:rPr lang="en-US" dirty="0" err="1">
+                <a:hlinkClick r:id="rId4"/>
+              </a:rPr>
+              <a:t>GraphSAGE</a:t>
+            </a:r>
+            <a:r>
+              <a:rPr lang="en-US" dirty="0"/>
+              <a:t>. However, </a:t>
+            </a:r>
+            <a:r>
+              <a:rPr lang="en-US" dirty="0">
+                <a:hlinkClick r:id="rId5"/>
+              </a:rPr>
+              <a:t>Graph Attention Network</a:t>
+            </a:r>
+            <a:r>
+              <a:rPr lang="en-US" dirty="0"/>
+              <a:t> proposes a different type of aggregation. GAN uses weighting neighbor features with feature dependent and structure-free normalization, in the style of attention.</a:t>
             </a:r>
           </a:p>
         </p:txBody>
@@ -1492,9 +1776,9 @@
           <a:bodyPr/>
           <a:lstStyle/>
           <a:p>
-            <a:fld id="{D1B04AD2-B2A0-4E66-8625-73A083E506E9}" type="slidenum">
+            <a:fld id="{9271DED1-4C91-4561-A99B-E6676363E223}" type="slidenum">
               <a:rPr lang="en-US" smtClean="0"/>
-              <a:t>5</a:t>
+              <a:t>4</a:t>
             </a:fld>
             <a:endParaRPr lang="en-US"/>
           </a:p>
@@ -1503,7 +1787,7 @@
     </p:spTree>
     <p:extLst>
       <p:ext uri="{BB962C8B-B14F-4D97-AF65-F5344CB8AC3E}">
-        <p14:creationId xmlns:p14="http://schemas.microsoft.com/office/powerpoint/2010/main" val="419485165"/>
+        <p14:creationId xmlns:p14="http://schemas.microsoft.com/office/powerpoint/2010/main" val="2807577603"/>
       </p:ext>
     </p:extLst>
   </p:cSld>
@@ -1557,30 +1841,10 @@
           <a:bodyPr/>
           <a:lstStyle/>
           <a:p>
-            <a:pPr marL="0" marR="0" lvl="0" indent="0" algn="l" defTabSz="914400" rtl="0" eaLnBrk="1" fontAlgn="auto" latinLnBrk="0" hangingPunct="1">
-              <a:lnSpc>
-                <a:spcPct val="100000"/>
-              </a:lnSpc>
-              <a:spcBef>
-                <a:spcPts val="0"/>
-              </a:spcBef>
-              <a:spcAft>
-                <a:spcPts val="0"/>
-              </a:spcAft>
-              <a:buClrTx/>
-              <a:buSzTx/>
-              <a:buFontTx/>
-              <a:buNone/>
-              <a:tabLst/>
-              <a:defRPr/>
-            </a:pPr>
             <a:r>
               <a:rPr lang="en-US" dirty="0"/>
-              <a:t>However, we can save space if we know that variables depend on a small set of other variables. Dependency structure allows to decompose large distribution functions into smaller ones that can latter on be combined. A dependency structure is a graph.</a:t>
-            </a:r>
-          </a:p>
-          <a:p>
-            <a:endParaRPr lang="en-US" dirty="0"/>
+              <a:t>Still exponential in the number of parents, but we do not expect too many parents. The reason being that we do not expect that everything is conditional on everything.</a:t>
+            </a:r>
           </a:p>
         </p:txBody>
       </p:sp>
@@ -1601,7 +1865,7 @@
           <a:p>
             <a:fld id="{D1B04AD2-B2A0-4E66-8625-73A083E506E9}" type="slidenum">
               <a:rPr lang="en-US" smtClean="0"/>
-              <a:t>6</a:t>
+              <a:t>5</a:t>
             </a:fld>
             <a:endParaRPr lang="en-US"/>
           </a:p>
@@ -1610,7 +1874,7 @@
     </p:spTree>
     <p:extLst>
       <p:ext uri="{BB962C8B-B14F-4D97-AF65-F5344CB8AC3E}">
-        <p14:creationId xmlns:p14="http://schemas.microsoft.com/office/powerpoint/2010/main" val="1726071502"/>
+        <p14:creationId xmlns:p14="http://schemas.microsoft.com/office/powerpoint/2010/main" val="419485165"/>
       </p:ext>
     </p:extLst>
   </p:cSld>
@@ -1664,108 +1928,6 @@
           <a:bodyPr/>
           <a:lstStyle/>
           <a:p>
-            <a:r>
-              <a:rPr lang="en-US" dirty="0"/>
-              <a:t>Hence, we need to be able to refine a graph model, for that we need a set of  operations and properties so we can test hypotheses about graph dependencies and independencies</a:t>
-            </a:r>
-          </a:p>
-          <a:p>
-            <a:endParaRPr lang="en-US" dirty="0"/>
-          </a:p>
-          <a:p>
-            <a:r>
-              <a:rPr lang="en-US" sz="1800" dirty="0">
-                <a:effectLst/>
-                <a:latin typeface="Calibri" panose="020F0502020204030204" pitchFamily="34" charset="0"/>
-              </a:rPr>
-              <a:t>[Sloane 2019] N. J. A. Sloane, </a:t>
-            </a:r>
-            <a:r>
-              <a:rPr lang="en-US" sz="1800" dirty="0">
-                <a:effectLst/>
-                <a:latin typeface="Times New Roman" panose="02020603050405020304" pitchFamily="18" charset="0"/>
-              </a:rPr>
-              <a:t>Number of acyclic digraphs (or DAGs) with n labeled nodes, in The Online Encyclopedia of Integer Sequences, available at </a:t>
-            </a:r>
-            <a:r>
-              <a:rPr lang="en-US" sz="1800" dirty="0">
-                <a:effectLst/>
-                <a:latin typeface="Calibri" panose="020F0502020204030204" pitchFamily="34" charset="0"/>
-                <a:hlinkClick r:id="rId3"/>
-              </a:rPr>
-              <a:t>http://oeis.org/A003024/b003024.txt</a:t>
-            </a:r>
-            <a:r>
-              <a:rPr lang="en-US" sz="1800" dirty="0">
-                <a:effectLst/>
-                <a:latin typeface="Calibri" panose="020F0502020204030204" pitchFamily="34" charset="0"/>
-              </a:rPr>
-              <a:t> (accessed May 2019)</a:t>
-            </a:r>
-          </a:p>
-          <a:p>
-            <a:endParaRPr lang="en-US" sz="1800" dirty="0">
-              <a:effectLst/>
-              <a:latin typeface="Calibri" panose="020F0502020204030204" pitchFamily="34" charset="0"/>
-            </a:endParaRPr>
-          </a:p>
-          <a:p>
-            <a:r>
-              <a:rPr lang="en-US" sz="1200" kern="1200" dirty="0">
-                <a:solidFill>
-                  <a:schemeClr val="tx1"/>
-                </a:solidFill>
-                <a:effectLst/>
-                <a:latin typeface="+mn-lt"/>
-                <a:ea typeface="+mn-ea"/>
-                <a:cs typeface="+mn-cs"/>
-              </a:rPr>
-              <a:t>However, nodes can be arranged in many different. Three nodes can be arranged in 25 different acyclic graphs (DAG), 4 nodes can compose 543, and 5 nodes 29281 DAGs, 6 nodes 3781503, and 7 to 1138779265 DAG. Yes, but how to know which is the correct mechanism?</a:t>
-            </a:r>
-          </a:p>
-          <a:p>
-            <a:r>
-              <a:rPr lang="en-US" sz="1200" kern="1200" dirty="0">
-                <a:solidFill>
-                  <a:schemeClr val="tx1"/>
-                </a:solidFill>
-                <a:effectLst/>
-                <a:latin typeface="+mn-lt"/>
-                <a:ea typeface="+mn-ea"/>
-                <a:cs typeface="+mn-cs"/>
-              </a:rPr>
-              <a:t> </a:t>
-            </a:r>
-          </a:p>
-          <a:p>
-            <a:r>
-              <a:rPr lang="en-US" sz="1200" kern="1200" dirty="0">
-                <a:solidFill>
-                  <a:schemeClr val="tx1"/>
-                </a:solidFill>
-                <a:effectLst/>
-                <a:latin typeface="+mn-lt"/>
-                <a:ea typeface="+mn-ea"/>
-                <a:cs typeface="+mn-cs"/>
-              </a:rPr>
-              <a:t>7 nodes = 4 million graphs</a:t>
-            </a:r>
-          </a:p>
-          <a:p>
-            <a:r>
-              <a:rPr lang="en-US" sz="1200" kern="1200" dirty="0">
-                <a:solidFill>
-                  <a:schemeClr val="tx1"/>
-                </a:solidFill>
-                <a:effectLst/>
-                <a:latin typeface="+mn-lt"/>
-                <a:ea typeface="+mn-ea"/>
-                <a:cs typeface="+mn-cs"/>
-              </a:rPr>
-              <a:t>8 nodes = 800 billion graphs</a:t>
-            </a:r>
-          </a:p>
-          <a:p>
             <a:pPr marL="0" marR="0" lvl="0" indent="0" algn="l" defTabSz="914400" rtl="0" eaLnBrk="1" fontAlgn="auto" latinLnBrk="0" hangingPunct="1">
               <a:lnSpc>
                 <a:spcPct val="100000"/>
@@ -1784,28 +1946,9 @@
               <a:defRPr/>
             </a:pPr>
             <a:r>
-              <a:rPr lang="en-US" sz="1200" kern="1200" dirty="0">
-                <a:solidFill>
-                  <a:schemeClr val="tx1"/>
-                </a:solidFill>
-                <a:effectLst/>
-                <a:latin typeface="+mn-lt"/>
-                <a:ea typeface="+mn-ea"/>
-                <a:cs typeface="+mn-cs"/>
-              </a:rPr>
-              <a:t>9 nodes = 1,548 times more (or 1.2 10^16 graphs)</a:t>
-            </a:r>
-          </a:p>
-          <a:p>
-            <a:endParaRPr lang="en-US" sz="1200" kern="1200" dirty="0">
-              <a:solidFill>
-                <a:schemeClr val="tx1"/>
-              </a:solidFill>
-              <a:effectLst/>
-              <a:latin typeface="+mn-lt"/>
-              <a:ea typeface="+mn-ea"/>
-              <a:cs typeface="+mn-cs"/>
-            </a:endParaRPr>
+              <a:rPr lang="en-US" dirty="0"/>
+              <a:t>However, we can save space if we know that variables depend on a small set of other variables. Dependency structure allows to decompose large distribution functions into smaller ones that can latter on be combined. A dependency structure is a graph.</a:t>
+            </a:r>
           </a:p>
           <a:p>
             <a:endParaRPr lang="en-US" dirty="0"/>
@@ -1829,7 +1972,7 @@
           <a:p>
             <a:fld id="{D1B04AD2-B2A0-4E66-8625-73A083E506E9}" type="slidenum">
               <a:rPr lang="en-US" smtClean="0"/>
-              <a:t>7</a:t>
+              <a:t>6</a:t>
             </a:fld>
             <a:endParaRPr lang="en-US"/>
           </a:p>
@@ -1838,7 +1981,7 @@
     </p:spTree>
     <p:extLst>
       <p:ext uri="{BB962C8B-B14F-4D97-AF65-F5344CB8AC3E}">
-        <p14:creationId xmlns:p14="http://schemas.microsoft.com/office/powerpoint/2010/main" val="1945339558"/>
+        <p14:creationId xmlns:p14="http://schemas.microsoft.com/office/powerpoint/2010/main" val="1726071502"/>
       </p:ext>
     </p:extLst>
   </p:cSld>
@@ -1892,6 +2035,108 @@
           <a:bodyPr/>
           <a:lstStyle/>
           <a:p>
+            <a:r>
+              <a:rPr lang="en-US" dirty="0"/>
+              <a:t>Hence, we need to be able to refine a graph model, for that we need a set of  operations and properties so we can test hypotheses about graph dependencies and independencies</a:t>
+            </a:r>
+          </a:p>
+          <a:p>
+            <a:endParaRPr lang="en-US" dirty="0"/>
+          </a:p>
+          <a:p>
+            <a:r>
+              <a:rPr lang="en-US" sz="1800" dirty="0">
+                <a:effectLst/>
+                <a:latin typeface="Calibri" panose="020F0502020204030204" pitchFamily="34" charset="0"/>
+              </a:rPr>
+              <a:t>[Sloane 2019] N. J. A. Sloane, </a:t>
+            </a:r>
+            <a:r>
+              <a:rPr lang="en-US" sz="1800" dirty="0">
+                <a:effectLst/>
+                <a:latin typeface="Times New Roman" panose="02020603050405020304" pitchFamily="18" charset="0"/>
+              </a:rPr>
+              <a:t>Number of acyclic digraphs (or DAGs) with n labeled nodes, in The Online Encyclopedia of Integer Sequences, available at </a:t>
+            </a:r>
+            <a:r>
+              <a:rPr lang="en-US" sz="1800" dirty="0">
+                <a:effectLst/>
+                <a:latin typeface="Calibri" panose="020F0502020204030204" pitchFamily="34" charset="0"/>
+                <a:hlinkClick r:id="rId3"/>
+              </a:rPr>
+              <a:t>http://oeis.org/A003024/b003024.txt</a:t>
+            </a:r>
+            <a:r>
+              <a:rPr lang="en-US" sz="1800" dirty="0">
+                <a:effectLst/>
+                <a:latin typeface="Calibri" panose="020F0502020204030204" pitchFamily="34" charset="0"/>
+              </a:rPr>
+              <a:t> (accessed May 2019)</a:t>
+            </a:r>
+          </a:p>
+          <a:p>
+            <a:endParaRPr lang="en-US" sz="1800" dirty="0">
+              <a:effectLst/>
+              <a:latin typeface="Calibri" panose="020F0502020204030204" pitchFamily="34" charset="0"/>
+            </a:endParaRPr>
+          </a:p>
+          <a:p>
+            <a:r>
+              <a:rPr lang="en-US" sz="1200" kern="1200" dirty="0">
+                <a:solidFill>
+                  <a:schemeClr val="tx1"/>
+                </a:solidFill>
+                <a:effectLst/>
+                <a:latin typeface="+mn-lt"/>
+                <a:ea typeface="+mn-ea"/>
+                <a:cs typeface="+mn-cs"/>
+              </a:rPr>
+              <a:t>However, nodes can be arranged in many different. Three nodes can be arranged in 25 different acyclic graphs (DAG), 4 nodes can compose 543, and 5 nodes 29281 DAGs, 6 nodes 3781503, and 7 to 1138779265 DAG. Yes, but how to know which is the correct mechanism?</a:t>
+            </a:r>
+          </a:p>
+          <a:p>
+            <a:r>
+              <a:rPr lang="en-US" sz="1200" kern="1200" dirty="0">
+                <a:solidFill>
+                  <a:schemeClr val="tx1"/>
+                </a:solidFill>
+                <a:effectLst/>
+                <a:latin typeface="+mn-lt"/>
+                <a:ea typeface="+mn-ea"/>
+                <a:cs typeface="+mn-cs"/>
+              </a:rPr>
+              <a:t> </a:t>
+            </a:r>
+          </a:p>
+          <a:p>
+            <a:r>
+              <a:rPr lang="en-US" sz="1200" kern="1200" dirty="0">
+                <a:solidFill>
+                  <a:schemeClr val="tx1"/>
+                </a:solidFill>
+                <a:effectLst/>
+                <a:latin typeface="+mn-lt"/>
+                <a:ea typeface="+mn-ea"/>
+                <a:cs typeface="+mn-cs"/>
+              </a:rPr>
+              <a:t>7 nodes = 4 million graphs</a:t>
+            </a:r>
+          </a:p>
+          <a:p>
+            <a:r>
+              <a:rPr lang="en-US" sz="1200" kern="1200" dirty="0">
+                <a:solidFill>
+                  <a:schemeClr val="tx1"/>
+                </a:solidFill>
+                <a:effectLst/>
+                <a:latin typeface="+mn-lt"/>
+                <a:ea typeface="+mn-ea"/>
+                <a:cs typeface="+mn-cs"/>
+              </a:rPr>
+              <a:t>8 nodes = 800 billion graphs</a:t>
+            </a:r>
+          </a:p>
+          <a:p>
             <a:pPr marL="0" marR="0" lvl="0" indent="0" algn="l" defTabSz="914400" rtl="0" eaLnBrk="1" fontAlgn="auto" latinLnBrk="0" hangingPunct="1">
               <a:lnSpc>
                 <a:spcPct val="100000"/>
@@ -1910,25 +2155,28 @@
               <a:defRPr/>
             </a:pPr>
             <a:r>
-              <a:rPr lang="en-US" dirty="0"/>
-              <a:t>Zhou, </a:t>
-            </a:r>
-            <a:r>
-              <a:rPr lang="en-US" dirty="0" err="1"/>
-              <a:t>Dawei</a:t>
-            </a:r>
-            <a:r>
-              <a:rPr lang="en-US" dirty="0"/>
-              <a:t>, et al. "A data-driven graph generative model for temporal interaction networks." </a:t>
-            </a:r>
-            <a:r>
-              <a:rPr lang="en-US" i="1" dirty="0"/>
-              <a:t>Proceedings of the 26th ACM SIGKDD International Conference on Knowledge Discovery &amp; Data Mining</a:t>
-            </a:r>
-            <a:r>
-              <a:rPr lang="en-US" dirty="0"/>
-              <a:t>. 2020.</a:t>
-            </a:r>
+              <a:rPr lang="en-US" sz="1200" kern="1200" dirty="0">
+                <a:solidFill>
+                  <a:schemeClr val="tx1"/>
+                </a:solidFill>
+                <a:effectLst/>
+                <a:latin typeface="+mn-lt"/>
+                <a:ea typeface="+mn-ea"/>
+                <a:cs typeface="+mn-cs"/>
+              </a:rPr>
+              <a:t>9 nodes = 1,548 times more (or 1.2 10^16 graphs)</a:t>
+            </a:r>
+          </a:p>
+          <a:p>
+            <a:endParaRPr lang="en-US" sz="1200" kern="1200" dirty="0">
+              <a:solidFill>
+                <a:schemeClr val="tx1"/>
+              </a:solidFill>
+              <a:effectLst/>
+              <a:latin typeface="+mn-lt"/>
+              <a:ea typeface="+mn-ea"/>
+              <a:cs typeface="+mn-cs"/>
+            </a:endParaRPr>
           </a:p>
           <a:p>
             <a:endParaRPr lang="en-US" dirty="0"/>
@@ -1950,9 +2198,9 @@
           <a:bodyPr/>
           <a:lstStyle/>
           <a:p>
-            <a:fld id="{9271DED1-4C91-4561-A99B-E6676363E223}" type="slidenum">
+            <a:fld id="{D1B04AD2-B2A0-4E66-8625-73A083E506E9}" type="slidenum">
               <a:rPr lang="en-US" smtClean="0"/>
-              <a:t>9</a:t>
+              <a:t>7</a:t>
             </a:fld>
             <a:endParaRPr lang="en-US"/>
           </a:p>
@@ -1961,7 +2209,7 @@
     </p:spTree>
     <p:extLst>
       <p:ext uri="{BB962C8B-B14F-4D97-AF65-F5344CB8AC3E}">
-        <p14:creationId xmlns:p14="http://schemas.microsoft.com/office/powerpoint/2010/main" val="3478167583"/>
+        <p14:creationId xmlns:p14="http://schemas.microsoft.com/office/powerpoint/2010/main" val="1945339558"/>
       </p:ext>
     </p:extLst>
   </p:cSld>
@@ -2015,28 +2263,46 @@
           <a:bodyPr/>
           <a:lstStyle/>
           <a:p>
-            <a:r>
-              <a:rPr lang="en-US" sz="1200" dirty="0"/>
-              <a:t>[You et al. 2018] You et. al, (2018), </a:t>
-            </a:r>
-            <a:r>
-              <a:rPr lang="en-US" dirty="0" err="1">
-                <a:effectLst/>
-                <a:latin typeface="Arial" panose="020B0604020202020204" pitchFamily="34" charset="0"/>
-              </a:rPr>
-              <a:t>GraphRNN</a:t>
-            </a:r>
-            <a:r>
-              <a:rPr lang="en-US" dirty="0">
-                <a:effectLst/>
-                <a:latin typeface="Arial" panose="020B0604020202020204" pitchFamily="34" charset="0"/>
-              </a:rPr>
-              <a:t>: Generating Realistic Graphs with Deep Auto-regressive Models, </a:t>
-            </a:r>
+            <a:pPr marL="0" marR="0" lvl="0" indent="0" algn="l" defTabSz="914400" rtl="0" eaLnBrk="1" fontAlgn="auto" latinLnBrk="0" hangingPunct="1">
+              <a:lnSpc>
+                <a:spcPct val="100000"/>
+              </a:lnSpc>
+              <a:spcBef>
+                <a:spcPts val="0"/>
+              </a:spcBef>
+              <a:spcAft>
+                <a:spcPts val="0"/>
+              </a:spcAft>
+              <a:buClrTx/>
+              <a:buSzTx/>
+              <a:buFontTx/>
+              <a:buNone/>
+              <a:tabLst/>
+              <a:defRPr/>
+            </a:pPr>
             <a:r>
               <a:rPr lang="en-US" dirty="0"/>
-              <a:t>ICML</a:t>
-            </a:r>
+              <a:t>Zhou, </a:t>
+            </a:r>
+            <a:r>
+              <a:rPr lang="en-US" dirty="0" err="1"/>
+              <a:t>Dawei</a:t>
+            </a:r>
+            <a:r>
+              <a:rPr lang="en-US" dirty="0"/>
+              <a:t>, et al. "A data-driven graph generative model for temporal interaction networks." </a:t>
+            </a:r>
+            <a:r>
+              <a:rPr lang="en-US" i="1" dirty="0"/>
+              <a:t>Proceedings of the 26th ACM SIGKDD International Conference on Knowledge Discovery &amp; Data Mining</a:t>
+            </a:r>
+            <a:r>
+              <a:rPr lang="en-US" dirty="0"/>
+              <a:t>. 2020.</a:t>
+            </a:r>
+          </a:p>
+          <a:p>
+            <a:endParaRPr lang="en-US" dirty="0"/>
           </a:p>
         </p:txBody>
       </p:sp>
@@ -2057,7 +2323,7 @@
           <a:p>
             <a:fld id="{9271DED1-4C91-4561-A99B-E6676363E223}" type="slidenum">
               <a:rPr lang="en-US" smtClean="0"/>
-              <a:t>12</a:t>
+              <a:t>9</a:t>
             </a:fld>
             <a:endParaRPr lang="en-US"/>
           </a:p>
@@ -2066,7 +2332,7 @@
     </p:spTree>
     <p:extLst>
       <p:ext uri="{BB962C8B-B14F-4D97-AF65-F5344CB8AC3E}">
-        <p14:creationId xmlns:p14="http://schemas.microsoft.com/office/powerpoint/2010/main" val="982026867"/>
+        <p14:creationId xmlns:p14="http://schemas.microsoft.com/office/powerpoint/2010/main" val="3478167583"/>
       </p:ext>
     </p:extLst>
   </p:cSld>
@@ -2120,38 +2386,28 @@
           <a:bodyPr/>
           <a:lstStyle/>
           <a:p>
-            <a:pPr marL="0" marR="0" lvl="0" indent="0" algn="l" defTabSz="914400" rtl="0" eaLnBrk="1" fontAlgn="auto" latinLnBrk="0" hangingPunct="1">
-              <a:lnSpc>
-                <a:spcPct val="100000"/>
-              </a:lnSpc>
-              <a:spcBef>
-                <a:spcPts val="0"/>
-              </a:spcBef>
-              <a:spcAft>
-                <a:spcPts val="0"/>
-              </a:spcAft>
-              <a:buClrTx/>
-              <a:buSzTx/>
-              <a:buFontTx/>
-              <a:buNone/>
-              <a:tabLst/>
-              <a:defRPr/>
-            </a:pPr>
+            <a:r>
+              <a:rPr lang="en-US" sz="1200" dirty="0"/>
+              <a:t>[You et al. 2018] You et. al, (2018), </a:t>
+            </a:r>
+            <a:r>
+              <a:rPr lang="en-US" dirty="0" err="1">
+                <a:effectLst/>
+                <a:latin typeface="Arial" panose="020B0604020202020204" pitchFamily="34" charset="0"/>
+              </a:rPr>
+              <a:t>GraphRNN</a:t>
+            </a:r>
+            <a:r>
+              <a:rPr lang="en-US" dirty="0">
+                <a:effectLst/>
+                <a:latin typeface="Arial" panose="020B0604020202020204" pitchFamily="34" charset="0"/>
+              </a:rPr>
+              <a:t>: Generating Realistic Graphs with Deep Auto-regressive Models, </a:t>
+            </a:r>
             <a:r>
               <a:rPr lang="en-US" dirty="0"/>
-              <a:t>Li, Y., et al., (2018), Multi-objective de novo drug design with conditional graph generative model. </a:t>
-            </a:r>
-            <a:r>
-              <a:rPr lang="en-US" i="1" dirty="0"/>
-              <a:t>Journal of cheminformatics</a:t>
-            </a:r>
-            <a:r>
-              <a:rPr lang="en-US" dirty="0"/>
-              <a:t> 10.1 (2018): 33.</a:t>
-            </a:r>
-          </a:p>
-          <a:p>
-            <a:endParaRPr lang="en-US" dirty="0"/>
+              <a:t>ICML</a:t>
+            </a:r>
           </a:p>
         </p:txBody>
       </p:sp>
@@ -2172,7 +2428,7 @@
           <a:p>
             <a:fld id="{9271DED1-4C91-4561-A99B-E6676363E223}" type="slidenum">
               <a:rPr lang="en-US" smtClean="0"/>
-              <a:t>13</a:t>
+              <a:t>12</a:t>
             </a:fld>
             <a:endParaRPr lang="en-US"/>
           </a:p>
@@ -2181,7 +2437,7 @@
     </p:spTree>
     <p:extLst>
       <p:ext uri="{BB962C8B-B14F-4D97-AF65-F5344CB8AC3E}">
-        <p14:creationId xmlns:p14="http://schemas.microsoft.com/office/powerpoint/2010/main" val="690784993"/>
+        <p14:creationId xmlns:p14="http://schemas.microsoft.com/office/powerpoint/2010/main" val="982026867"/>
       </p:ext>
     </p:extLst>
   </p:cSld>
@@ -2287,7 +2543,7 @@
           <a:p>
             <a:fld id="{9271DED1-4C91-4561-A99B-E6676363E223}" type="slidenum">
               <a:rPr lang="en-US" smtClean="0"/>
-              <a:t>14</a:t>
+              <a:t>13</a:t>
             </a:fld>
             <a:endParaRPr lang="en-US"/>
           </a:p>
@@ -2296,7 +2552,7 @@
     </p:spTree>
     <p:extLst>
       <p:ext uri="{BB962C8B-B14F-4D97-AF65-F5344CB8AC3E}">
-        <p14:creationId xmlns:p14="http://schemas.microsoft.com/office/powerpoint/2010/main" val="4264983013"/>
+        <p14:creationId xmlns:p14="http://schemas.microsoft.com/office/powerpoint/2010/main" val="690784993"/>
       </p:ext>
     </p:extLst>
   </p:cSld>
@@ -4030,7 +4286,7 @@
           <a:p>
             <a:fld id="{D454A11C-5A77-4A08-B879-6DBBFDBBDAFE}" type="datetime1">
               <a:rPr lang="en-US" smtClean="0"/>
-              <a:t>1/13/2021</a:t>
+              <a:t>1/15/2021</a:t>
             </a:fld>
             <a:endParaRPr lang="en-US"/>
           </a:p>
@@ -4319,7 +4575,7 @@
           <a:p>
             <a:fld id="{AC73922D-9081-40A6-8FBE-63670167AD98}" type="datetime1">
               <a:rPr lang="en-US" smtClean="0"/>
-              <a:t>1/13/2021</a:t>
+              <a:t>1/15/2021</a:t>
             </a:fld>
             <a:endParaRPr lang="en-US"/>
           </a:p>
@@ -4608,7 +4864,7 @@
           <a:p>
             <a:fld id="{EC26F5A0-C9D2-4F77-B347-D66BED85257B}" type="datetime1">
               <a:rPr lang="en-US" smtClean="0"/>
-              <a:t>1/13/2021</a:t>
+              <a:t>1/15/2021</a:t>
             </a:fld>
             <a:endParaRPr lang="en-US"/>
           </a:p>
@@ -4897,7 +5153,7 @@
           <a:p>
             <a:fld id="{2B6F2430-900B-4222-905F-EED32BFA1589}" type="datetime1">
               <a:rPr lang="en-US" smtClean="0"/>
-              <a:t>1/13/2021</a:t>
+              <a:t>1/15/2021</a:t>
             </a:fld>
             <a:endParaRPr lang="en-US"/>
           </a:p>
@@ -5134,7 +5390,7 @@
           <a:p>
             <a:fld id="{2CD130E0-640E-4C5D-8D16-DE7F41FBD753}" type="datetime1">
               <a:rPr lang="en-US" smtClean="0"/>
-              <a:t>1/13/2021</a:t>
+              <a:t>1/15/2021</a:t>
             </a:fld>
             <a:endParaRPr lang="en-US"/>
           </a:p>
@@ -5591,7 +5847,7 @@
           <a:p>
             <a:fld id="{627B7EA4-B0EA-4318-A076-3B69835E495A}" type="datetime1">
               <a:rPr lang="en-US" smtClean="0"/>
-              <a:t>1/13/2021</a:t>
+              <a:t>1/15/2021</a:t>
             </a:fld>
             <a:endParaRPr lang="en-US"/>
           </a:p>
@@ -5782,7 +6038,7 @@
           <a:p>
             <a:fld id="{7ED4FE29-361C-4DC2-A7C6-B5E089DF3A91}" type="datetime1">
               <a:rPr lang="en-US" smtClean="0"/>
-              <a:t>1/13/2021</a:t>
+              <a:t>1/15/2021</a:t>
             </a:fld>
             <a:endParaRPr lang="en-US"/>
           </a:p>
@@ -8155,7 +8411,7 @@
           <a:p>
             <a:fld id="{862788D6-C652-4921-A5E0-02F81E20745E}" type="datetime1">
               <a:rPr lang="en-US" smtClean="0"/>
-              <a:t>1/13/2021</a:t>
+              <a:t>1/15/2021</a:t>
             </a:fld>
             <a:endParaRPr lang="en-US"/>
           </a:p>
@@ -8405,7 +8661,7 @@
           <a:p>
             <a:fld id="{489C13DB-7338-4DF2-835C-1A17F38879EE}" type="datetime1">
               <a:rPr lang="en-US" smtClean="0"/>
-              <a:t>1/13/2021</a:t>
+              <a:t>1/15/2021</a:t>
             </a:fld>
             <a:endParaRPr lang="en-US"/>
           </a:p>
@@ -8791,7 +9047,7 @@
           <a:p>
             <a:fld id="{1182EF5F-566B-49EC-B494-C7B2A0F6EE3D}" type="datetime1">
               <a:rPr lang="en-US" smtClean="0"/>
-              <a:t>1/13/2021</a:t>
+              <a:t>1/15/2021</a:t>
             </a:fld>
             <a:endParaRPr lang="en-US"/>
           </a:p>
@@ -9051,7 +9307,7 @@
           <a:p>
             <a:fld id="{4F02E37B-40D6-4AF0-9DE8-D954394DFF71}" type="datetime1">
               <a:rPr lang="en-US" smtClean="0"/>
-              <a:t>1/13/2021</a:t>
+              <a:t>1/15/2021</a:t>
             </a:fld>
             <a:endParaRPr lang="en-US"/>
           </a:p>
@@ -11266,8 +11522,8 @@
           </a:p>
         </p:txBody>
       </p:sp>
-      <mc:AlternateContent xmlns:mc="http://schemas.openxmlformats.org/markup-compatibility/2006">
-        <mc:Choice xmlns:a14="http://schemas.microsoft.com/office/drawing/2010/main" Requires="a14">
+      <mc:AlternateContent xmlns:mc="http://schemas.openxmlformats.org/markup-compatibility/2006" xmlns:a14="http://schemas.microsoft.com/office/drawing/2010/main">
+        <mc:Choice Requires="a14">
           <p:sp>
             <p:nvSpPr>
               <p:cNvPr id="3" name="Content Placeholder 2">
@@ -11642,7 +11898,7 @@
             </p:txBody>
           </p:sp>
         </mc:Choice>
-        <mc:Fallback>
+        <mc:Fallback xmlns="">
           <p:sp>
             <p:nvSpPr>
               <p:cNvPr id="3" name="Content Placeholder 2">
@@ -11715,8 +11971,8 @@
           </a:p>
         </p:txBody>
       </p:sp>
-      <mc:AlternateContent xmlns:mc="http://schemas.openxmlformats.org/markup-compatibility/2006">
-        <mc:Choice xmlns:a14="http://schemas.microsoft.com/office/drawing/2010/main" Requires="a14">
+      <mc:AlternateContent xmlns:mc="http://schemas.openxmlformats.org/markup-compatibility/2006" xmlns:a14="http://schemas.microsoft.com/office/drawing/2010/main">
+        <mc:Choice Requires="a14">
           <p:sp>
             <p:nvSpPr>
               <p:cNvPr id="7" name="TextBox 6">
@@ -11763,14 +12019,14 @@
                       <m:sSubPr>
                         <m:ctrlPr>
                           <a:rPr lang="en-US" b="1" i="1" dirty="0" smtClean="0">
-                            <a:latin typeface="+mj-lt"/>
+                            <a:latin typeface="Cambria Math" panose="02040503050406030204" pitchFamily="18" charset="0"/>
                           </a:rPr>
                         </m:ctrlPr>
                       </m:sSubPr>
                       <m:e>
                         <m:r>
                           <a:rPr lang="en-US" b="1" i="1" dirty="0" smtClean="0">
-                            <a:latin typeface="+mj-lt"/>
+                            <a:latin typeface="Cambria Math" panose="02040503050406030204" pitchFamily="18" charset="0"/>
                           </a:rPr>
                           <m:t>𝒑</m:t>
                         </m:r>
@@ -11778,7 +12034,7 @@
                       <m:sub>
                         <m:r>
                           <a:rPr lang="en-US" b="1" i="1" dirty="0" smtClean="0">
-                            <a:latin typeface="+mj-lt"/>
+                            <a:latin typeface="Cambria Math" panose="02040503050406030204" pitchFamily="18" charset="0"/>
                           </a:rPr>
                           <m:t>𝒅𝒂𝒕𝒂</m:t>
                         </m:r>
@@ -11786,19 +12042,19 @@
                     </m:sSub>
                     <m:r>
                       <a:rPr lang="en-US" b="1" i="1" dirty="0" smtClean="0">
-                        <a:latin typeface="+mj-lt"/>
+                        <a:latin typeface="Cambria Math" panose="02040503050406030204" pitchFamily="18" charset="0"/>
                       </a:rPr>
                       <m:t>(</m:t>
                     </m:r>
                     <m:r>
                       <a:rPr lang="en-US" b="1" i="1" dirty="0" smtClean="0">
-                        <a:latin typeface="+mj-lt"/>
+                        <a:latin typeface="Cambria Math" panose="02040503050406030204" pitchFamily="18" charset="0"/>
                       </a:rPr>
                       <m:t>𝑮</m:t>
                     </m:r>
                     <m:r>
                       <a:rPr lang="en-US" b="1" i="1" dirty="0" smtClean="0">
-                        <a:latin typeface="+mj-lt"/>
+                        <a:latin typeface="Cambria Math" panose="02040503050406030204" pitchFamily="18" charset="0"/>
                       </a:rPr>
                       <m:t>)</m:t>
                     </m:r>
@@ -11823,7 +12079,7 @@
             </p:txBody>
           </p:sp>
         </mc:Choice>
-        <mc:Fallback>
+        <mc:Fallback xmlns="">
           <p:sp>
             <p:nvSpPr>
               <p:cNvPr id="7" name="TextBox 6">
@@ -11868,8 +12124,8 @@
           </p:sp>
         </mc:Fallback>
       </mc:AlternateContent>
-      <mc:AlternateContent xmlns:mc="http://schemas.openxmlformats.org/markup-compatibility/2006">
-        <mc:Choice xmlns:a14="http://schemas.microsoft.com/office/drawing/2010/main" Requires="a14">
+      <mc:AlternateContent xmlns:mc="http://schemas.openxmlformats.org/markup-compatibility/2006" xmlns:a14="http://schemas.microsoft.com/office/drawing/2010/main">
+        <mc:Choice Requires="a14">
           <p:sp>
             <p:nvSpPr>
               <p:cNvPr id="8" name="TextBox 7">
@@ -11916,14 +12172,14 @@
                       <m:sSubPr>
                         <m:ctrlPr>
                           <a:rPr lang="en-US" b="1" i="1" dirty="0" smtClean="0">
-                            <a:latin typeface="+mj-lt"/>
+                            <a:latin typeface="Cambria Math" panose="02040503050406030204" pitchFamily="18" charset="0"/>
                           </a:rPr>
                         </m:ctrlPr>
                       </m:sSubPr>
                       <m:e>
                         <m:r>
                           <a:rPr lang="en-US" b="1" i="1" dirty="0" smtClean="0">
-                            <a:latin typeface="+mj-lt"/>
+                            <a:latin typeface="Cambria Math" panose="02040503050406030204" pitchFamily="18" charset="0"/>
                           </a:rPr>
                           <m:t>𝒑</m:t>
                         </m:r>
@@ -11939,19 +12195,19 @@
                     </m:sSub>
                     <m:r>
                       <a:rPr lang="en-US" b="1" i="1" dirty="0" smtClean="0">
-                        <a:latin typeface="+mj-lt"/>
+                        <a:latin typeface="Cambria Math" panose="02040503050406030204" pitchFamily="18" charset="0"/>
                       </a:rPr>
                       <m:t>(</m:t>
                     </m:r>
                     <m:r>
                       <a:rPr lang="en-US" b="1" i="1" dirty="0" smtClean="0">
-                        <a:latin typeface="+mj-lt"/>
+                        <a:latin typeface="Cambria Math" panose="02040503050406030204" pitchFamily="18" charset="0"/>
                       </a:rPr>
                       <m:t>𝑮</m:t>
                     </m:r>
                     <m:r>
                       <a:rPr lang="en-US" b="1" i="1" dirty="0" smtClean="0">
-                        <a:latin typeface="+mj-lt"/>
+                        <a:latin typeface="Cambria Math" panose="02040503050406030204" pitchFamily="18" charset="0"/>
                       </a:rPr>
                       <m:t>)</m:t>
                     </m:r>
@@ -12029,7 +12285,7 @@
             </p:txBody>
           </p:sp>
         </mc:Choice>
-        <mc:Fallback>
+        <mc:Fallback xmlns="">
           <p:sp>
             <p:nvSpPr>
               <p:cNvPr id="8" name="TextBox 7">
@@ -12229,8 +12485,8 @@
           </a:p>
         </p:txBody>
       </p:sp>
-      <mc:AlternateContent xmlns:mc="http://schemas.openxmlformats.org/markup-compatibility/2006">
-        <mc:Choice xmlns:a14="http://schemas.microsoft.com/office/drawing/2010/main" Requires="a14">
+      <mc:AlternateContent xmlns:mc="http://schemas.openxmlformats.org/markup-compatibility/2006" xmlns:a14="http://schemas.microsoft.com/office/drawing/2010/main">
+        <mc:Choice Requires="a14">
           <p:sp>
             <p:nvSpPr>
               <p:cNvPr id="3" name="Content Placeholder 2">
@@ -12343,7 +12599,7 @@
             </p:txBody>
           </p:sp>
         </mc:Choice>
-        <mc:Fallback>
+        <mc:Fallback xmlns="">
           <p:sp>
             <p:nvSpPr>
               <p:cNvPr id="3" name="Content Placeholder 2">
@@ -12476,8 +12732,8 @@
           </a:prstGeom>
         </p:spPr>
       </p:pic>
-      <mc:AlternateContent xmlns:mc="http://schemas.openxmlformats.org/markup-compatibility/2006">
-        <mc:Choice xmlns:a14="http://schemas.microsoft.com/office/drawing/2010/main" Requires="a14">
+      <mc:AlternateContent xmlns:mc="http://schemas.openxmlformats.org/markup-compatibility/2006" xmlns:a14="http://schemas.microsoft.com/office/drawing/2010/main">
+        <mc:Choice Requires="a14">
           <p:sp>
             <p:nvSpPr>
               <p:cNvPr id="9" name="TextBox 8">
@@ -12615,7 +12871,7 @@
             </p:txBody>
           </p:sp>
         </mc:Choice>
-        <mc:Fallback>
+        <mc:Fallback xmlns="">
           <p:sp>
             <p:nvSpPr>
               <p:cNvPr id="9" name="TextBox 8">
@@ -12839,8 +13095,8 @@
           </a:prstGeom>
         </p:spPr>
       </p:pic>
-      <mc:AlternateContent xmlns:mc="http://schemas.openxmlformats.org/markup-compatibility/2006">
-        <mc:Choice xmlns:a14="http://schemas.microsoft.com/office/drawing/2010/main" Requires="a14">
+      <mc:AlternateContent xmlns:mc="http://schemas.openxmlformats.org/markup-compatibility/2006" xmlns:a14="http://schemas.microsoft.com/office/drawing/2010/main">
+        <mc:Choice Requires="a14">
           <p:sp>
             <p:nvSpPr>
               <p:cNvPr id="8" name="TextBox 7">
@@ -13000,7 +13256,7 @@
             </p:txBody>
           </p:sp>
         </mc:Choice>
-        <mc:Fallback>
+        <mc:Fallback xmlns="">
           <p:sp>
             <p:nvSpPr>
               <p:cNvPr id="8" name="TextBox 7">
@@ -13045,8 +13301,8 @@
           </p:sp>
         </mc:Fallback>
       </mc:AlternateContent>
-      <mc:AlternateContent xmlns:mc="http://schemas.openxmlformats.org/markup-compatibility/2006">
-        <mc:Choice xmlns:a14="http://schemas.microsoft.com/office/drawing/2010/main" Requires="a14">
+      <mc:AlternateContent xmlns:mc="http://schemas.openxmlformats.org/markup-compatibility/2006" xmlns:a14="http://schemas.microsoft.com/office/drawing/2010/main">
+        <mc:Choice Requires="a14">
           <p:sp>
             <p:nvSpPr>
               <p:cNvPr id="10" name="TextBox 9">
@@ -13188,7 +13444,7 @@
             </p:txBody>
           </p:sp>
         </mc:Choice>
-        <mc:Fallback>
+        <mc:Fallback xmlns="">
           <p:sp>
             <p:nvSpPr>
               <p:cNvPr id="10" name="TextBox 9">
@@ -15193,6 +15449,277 @@
           <p:cNvPr id="2" name="Title 1">
             <a:extLst>
               <a:ext uri="{FF2B5EF4-FFF2-40B4-BE49-F238E27FC236}">
+                <a16:creationId xmlns:a16="http://schemas.microsoft.com/office/drawing/2014/main" id="{7924AAF2-C3EA-4DEC-BCFE-5A29051A877C}"/>
+              </a:ext>
+            </a:extLst>
+          </p:cNvPr>
+          <p:cNvSpPr>
+            <a:spLocks noGrp="1"/>
+          </p:cNvSpPr>
+          <p:nvPr>
+            <p:ph type="title"/>
+          </p:nvPr>
+        </p:nvSpPr>
+        <p:spPr/>
+        <p:txBody>
+          <a:bodyPr/>
+          <a:lstStyle/>
+          <a:p>
+            <a:r>
+              <a:rPr lang="en-US" dirty="0"/>
+              <a:t>Recommended further reading</a:t>
+            </a:r>
+          </a:p>
+        </p:txBody>
+      </p:sp>
+      <p:sp>
+        <p:nvSpPr>
+          <p:cNvPr id="3" name="Content Placeholder 2">
+            <a:extLst>
+              <a:ext uri="{FF2B5EF4-FFF2-40B4-BE49-F238E27FC236}">
+                <a16:creationId xmlns:a16="http://schemas.microsoft.com/office/drawing/2014/main" id="{2B4AD473-C46B-434E-9888-FA7F17BB3A9A}"/>
+              </a:ext>
+            </a:extLst>
+          </p:cNvPr>
+          <p:cNvSpPr>
+            <a:spLocks noGrp="1"/>
+          </p:cNvSpPr>
+          <p:nvPr>
+            <p:ph idx="1"/>
+          </p:nvPr>
+        </p:nvSpPr>
+        <p:spPr>
+          <a:xfrm>
+            <a:off x="478369" y="1213308"/>
+            <a:ext cx="11473384" cy="4733604"/>
+          </a:xfrm>
+        </p:spPr>
+        <p:txBody>
+          <a:bodyPr/>
+          <a:lstStyle/>
+          <a:p>
+            <a:pPr marL="342900" indent="-342900">
+              <a:buFont typeface="Arial" panose="020B0604020202020204" pitchFamily="34" charset="0"/>
+              <a:buChar char="•"/>
+            </a:pPr>
+            <a:r>
+              <a:rPr lang="en-US" dirty="0"/>
+              <a:t>Li, </a:t>
+            </a:r>
+            <a:r>
+              <a:rPr lang="en-US" dirty="0" err="1"/>
+              <a:t>Yujia</a:t>
+            </a:r>
+            <a:r>
+              <a:rPr lang="en-US" dirty="0"/>
+              <a:t>, et al. "Learning deep generative models of graphs." </a:t>
+            </a:r>
+            <a:r>
+              <a:rPr lang="en-US" i="1" dirty="0" err="1"/>
+              <a:t>arXiv</a:t>
+            </a:r>
+            <a:r>
+              <a:rPr lang="en-US" i="1" dirty="0"/>
+              <a:t> preprint arXiv:1803.03324</a:t>
+            </a:r>
+            <a:r>
+              <a:rPr lang="en-US" dirty="0"/>
+              <a:t> (2018).</a:t>
+            </a:r>
+          </a:p>
+          <a:p>
+            <a:pPr marL="342900" indent="-342900">
+              <a:buFont typeface="Arial" panose="020B0604020202020204" pitchFamily="34" charset="0"/>
+              <a:buChar char="•"/>
+            </a:pPr>
+            <a:r>
+              <a:rPr lang="en-US" dirty="0"/>
+              <a:t>Van Den Oord, Aaron, and Oriol </a:t>
+            </a:r>
+            <a:r>
+              <a:rPr lang="en-US" dirty="0" err="1"/>
+              <a:t>Vinyals</a:t>
+            </a:r>
+            <a:r>
+              <a:rPr lang="en-US" dirty="0"/>
+              <a:t>. "Neural discrete representation learning." </a:t>
+            </a:r>
+            <a:r>
+              <a:rPr lang="en-US" i="1" dirty="0"/>
+              <a:t>Advances in Neural Information Processing Systems</a:t>
+            </a:r>
+            <a:r>
+              <a:rPr lang="en-US" dirty="0"/>
+              <a:t>. 2017.</a:t>
+            </a:r>
+          </a:p>
+          <a:p>
+            <a:pPr marL="342900" indent="-342900">
+              <a:buFont typeface="Arial" panose="020B0604020202020204" pitchFamily="34" charset="0"/>
+              <a:buChar char="•"/>
+            </a:pPr>
+            <a:r>
+              <a:rPr lang="en-US" dirty="0"/>
+              <a:t>Ha, David, and Jürgen </a:t>
+            </a:r>
+            <a:r>
+              <a:rPr lang="en-US" dirty="0" err="1"/>
+              <a:t>Schmidhuber</a:t>
+            </a:r>
+            <a:r>
+              <a:rPr lang="en-US" dirty="0"/>
+              <a:t>. "World models." </a:t>
+            </a:r>
+            <a:r>
+              <a:rPr lang="en-US" i="1" dirty="0" err="1"/>
+              <a:t>arXiv</a:t>
+            </a:r>
+            <a:r>
+              <a:rPr lang="en-US" i="1" dirty="0"/>
+              <a:t> preprint arXiv:1803.10122</a:t>
+            </a:r>
+            <a:r>
+              <a:rPr lang="en-US" dirty="0"/>
+              <a:t> (2018).</a:t>
+            </a:r>
+          </a:p>
+          <a:p>
+            <a:pPr marL="342900" indent="-342900">
+              <a:buFont typeface="Arial" panose="020B0604020202020204" pitchFamily="34" charset="0"/>
+              <a:buChar char="•"/>
+            </a:pPr>
+            <a:r>
+              <a:rPr lang="en-US" dirty="0" err="1"/>
+              <a:t>Robine</a:t>
+            </a:r>
+            <a:r>
+              <a:rPr lang="en-US" dirty="0"/>
+              <a:t>, Jan, Tobias </a:t>
+            </a:r>
+            <a:r>
+              <a:rPr lang="en-US" dirty="0" err="1"/>
+              <a:t>Uelwer</a:t>
+            </a:r>
+            <a:r>
+              <a:rPr lang="en-US" dirty="0"/>
+              <a:t>, and Stefan Harmeling. "Discrete Latent Space World Models for Reinforcement Learning." </a:t>
+            </a:r>
+            <a:r>
+              <a:rPr lang="en-US" i="1" dirty="0" err="1"/>
+              <a:t>arXiv</a:t>
+            </a:r>
+            <a:r>
+              <a:rPr lang="en-US" i="1" dirty="0"/>
+              <a:t> preprint arXiv:2010.05767</a:t>
+            </a:r>
+            <a:r>
+              <a:rPr lang="en-US" dirty="0"/>
+              <a:t> (2020).</a:t>
+            </a:r>
+          </a:p>
+          <a:p>
+            <a:pPr marL="342900" indent="-342900">
+              <a:buFont typeface="Arial" panose="020B0604020202020204" pitchFamily="34" charset="0"/>
+              <a:buChar char="•"/>
+            </a:pPr>
+            <a:r>
+              <a:rPr lang="en-US" dirty="0" err="1"/>
+              <a:t>Lassance</a:t>
+            </a:r>
+            <a:r>
+              <a:rPr lang="en-US" dirty="0"/>
+              <a:t>, Carlos. "Graphs for deep learning representations." </a:t>
+            </a:r>
+            <a:r>
+              <a:rPr lang="en-US" i="1" dirty="0" err="1"/>
+              <a:t>arXiv</a:t>
+            </a:r>
+            <a:r>
+              <a:rPr lang="en-US" i="1" dirty="0"/>
+              <a:t> preprint arXiv:2012.07439</a:t>
+            </a:r>
+            <a:r>
+              <a:rPr lang="en-US" dirty="0"/>
+              <a:t> (</a:t>
+            </a:r>
+            <a:r>
+              <a:rPr lang="en-US"/>
+              <a:t>2020).</a:t>
+            </a:r>
+            <a:endParaRPr lang="en-US" dirty="0"/>
+          </a:p>
+          <a:p>
+            <a:endParaRPr lang="en-US" dirty="0"/>
+          </a:p>
+          <a:p>
+            <a:endParaRPr lang="en-US" dirty="0"/>
+          </a:p>
+        </p:txBody>
+      </p:sp>
+      <p:sp>
+        <p:nvSpPr>
+          <p:cNvPr id="4" name="Slide Number Placeholder 3">
+            <a:extLst>
+              <a:ext uri="{FF2B5EF4-FFF2-40B4-BE49-F238E27FC236}">
+                <a16:creationId xmlns:a16="http://schemas.microsoft.com/office/drawing/2014/main" id="{3735EE55-FB42-480F-8E49-02F735BAC747}"/>
+              </a:ext>
+            </a:extLst>
+          </p:cNvPr>
+          <p:cNvSpPr>
+            <a:spLocks noGrp="1"/>
+          </p:cNvSpPr>
+          <p:nvPr>
+            <p:ph type="sldNum" sz="quarter" idx="12"/>
+          </p:nvPr>
+        </p:nvSpPr>
+        <p:spPr/>
+        <p:txBody>
+          <a:bodyPr/>
+          <a:lstStyle/>
+          <a:p>
+            <a:fld id="{81561042-0DC2-4A04-AA50-F6D44EB20EBA}" type="slidenum">
+              <a:rPr lang="en-US" smtClean="0"/>
+              <a:t>17</a:t>
+            </a:fld>
+            <a:endParaRPr lang="en-US"/>
+          </a:p>
+        </p:txBody>
+      </p:sp>
+    </p:spTree>
+    <p:extLst>
+      <p:ext uri="{BB962C8B-B14F-4D97-AF65-F5344CB8AC3E}">
+        <p14:creationId xmlns:p14="http://schemas.microsoft.com/office/powerpoint/2010/main" val="3732134899"/>
+      </p:ext>
+    </p:extLst>
+  </p:cSld>
+  <p:clrMapOvr>
+    <a:masterClrMapping/>
+  </p:clrMapOvr>
+</p:sld>
+</file>
+
+<file path=ppt/slides/slide18.xml><?xml version="1.0" encoding="utf-8"?>
+<p:sld xmlns:a="http://schemas.openxmlformats.org/drawingml/2006/main" xmlns:r="http://schemas.openxmlformats.org/officeDocument/2006/relationships" xmlns:p="http://schemas.openxmlformats.org/presentationml/2006/main">
+  <p:cSld>
+    <p:spTree>
+      <p:nvGrpSpPr>
+        <p:cNvPr id="1" name=""/>
+        <p:cNvGrpSpPr/>
+        <p:nvPr/>
+      </p:nvGrpSpPr>
+      <p:grpSpPr>
+        <a:xfrm>
+          <a:off x="0" y="0"/>
+          <a:ext cx="0" cy="0"/>
+          <a:chOff x="0" y="0"/>
+          <a:chExt cx="0" cy="0"/>
+        </a:xfrm>
+      </p:grpSpPr>
+      <p:sp>
+        <p:nvSpPr>
+          <p:cNvPr id="2" name="Title 1">
+            <a:extLst>
+              <a:ext uri="{FF2B5EF4-FFF2-40B4-BE49-F238E27FC236}">
                 <a16:creationId xmlns:a16="http://schemas.microsoft.com/office/drawing/2014/main" id="{F556059A-837B-4E70-85E0-77BA2416952C}"/>
               </a:ext>
             </a:extLst>
@@ -15346,7 +15873,7 @@
             </a:pPr>
             <a:r>
               <a:rPr lang="en-US" dirty="0"/>
-              <a:t>Three alternative with different options for embedding, aggregation, and encoding</a:t>
+              <a:t>Three alternatives with different options for embedding, aggregation, and encoding</a:t>
             </a:r>
           </a:p>
           <a:p>
@@ -15414,7 +15941,7 @@
           <a:p>
             <a:fld id="{81561042-0DC2-4A04-AA50-F6D44EB20EBA}" type="slidenum">
               <a:rPr lang="en-US" smtClean="0"/>
-              <a:t>17</a:t>
+              <a:t>18</a:t>
             </a:fld>
             <a:endParaRPr lang="en-US"/>
           </a:p>
@@ -15433,7 +15960,7 @@
 </p:sld>
 </file>
 
-<file path=ppt/slides/slide18.xml><?xml version="1.0" encoding="utf-8"?>
+<file path=ppt/slides/slide19.xml><?xml version="1.0" encoding="utf-8"?>
 <p:sld xmlns:a="http://schemas.openxmlformats.org/drawingml/2006/main" xmlns:r="http://schemas.openxmlformats.org/officeDocument/2006/relationships" xmlns:p="http://schemas.openxmlformats.org/presentationml/2006/main">
   <p:cSld>
     <p:spTree>
@@ -15583,8 +16110,13 @@
             </a:pPr>
             <a:r>
               <a:rPr lang="en-US" sz="2000" dirty="0"/>
-              <a:t>Generative Models give insights into the phenomena that produces the graphs and networks.</a:t>
-            </a:r>
+              <a:t>Generative Models give insights into the phenomena that produced the graphs and networks in the </a:t>
+            </a:r>
+            <a:r>
+              <a:rPr lang="en-US" sz="2000"/>
+              <a:t>first place.</a:t>
+            </a:r>
+            <a:endParaRPr lang="en-US" sz="2000" dirty="0"/>
           </a:p>
           <a:p>
             <a:pPr marL="285750" indent="-285750">
@@ -15781,13 +16313,18 @@
         <p:spPr>
           <a:xfrm>
             <a:off x="359308" y="875556"/>
-            <a:ext cx="11473384" cy="5829545"/>
+            <a:ext cx="11473384" cy="5981189"/>
           </a:xfrm>
         </p:spPr>
         <p:txBody>
           <a:bodyPr/>
           <a:lstStyle/>
           <a:p>
+            <a:pPr>
+              <a:lnSpc>
+                <a:spcPct val="100000"/>
+              </a:lnSpc>
+            </a:pPr>
             <a:r>
               <a:rPr lang="en-US" b="1" dirty="0"/>
               <a:t>Traditional Generative Models:</a:t>
@@ -15842,7 +16379,7 @@
             </a:pPr>
             <a:r>
               <a:rPr lang="en-US" sz="1800" dirty="0"/>
-              <a:t>Bayesian network (e.g. Naive bayes, Autoregressive model)</a:t>
+              <a:t>Bayesian network (e.g., Naive bayes, Autoregressive model)</a:t>
             </a:r>
           </a:p>
           <a:p>
@@ -15881,7 +16418,7 @@
             </a:pPr>
             <a:r>
               <a:rPr lang="en-US" sz="1800" dirty="0"/>
-              <a:t>Boltzmann machine (e.g. Restricted Boltzmann machine, Deep belief network)</a:t>
+              <a:t>Boltzmann machine (e.g., Restricted Boltzmann machine, Deep belief network)</a:t>
             </a:r>
           </a:p>
           <a:p>
@@ -15937,21 +16474,55 @@
             </a:r>
           </a:p>
           <a:p>
+            <a:pPr>
+              <a:lnSpc>
+                <a:spcPct val="100000"/>
+              </a:lnSpc>
+            </a:pPr>
             <a:r>
               <a:rPr lang="en-US" sz="1800" b="1" dirty="0"/>
               <a:t>Deep Generative Models</a:t>
             </a:r>
           </a:p>
           <a:p>
+            <a:pPr>
+              <a:lnSpc>
+                <a:spcPct val="100000"/>
+              </a:lnSpc>
+            </a:pPr>
             <a:r>
               <a:rPr lang="en-US" sz="1800" dirty="0"/>
               <a:t>Adversarial Networks</a:t>
             </a:r>
           </a:p>
           <a:p>
+            <a:pPr>
+              <a:lnSpc>
+                <a:spcPct val="100000"/>
+              </a:lnSpc>
+            </a:pPr>
             <a:r>
               <a:rPr lang="en-US" sz="1800" dirty="0"/>
               <a:t>Generative Pre-trained Transformer 3 (GPT-3)</a:t>
+            </a:r>
+          </a:p>
+          <a:p>
+            <a:pPr>
+              <a:lnSpc>
+                <a:spcPct val="100000"/>
+              </a:lnSpc>
+            </a:pPr>
+            <a:r>
+              <a:rPr lang="en-US" sz="1800" dirty="0"/>
+              <a:t>Variational Auto-Encoders [Van den Oord et al. 2017][</a:t>
+            </a:r>
+            <a:r>
+              <a:rPr lang="en-US" sz="1800" dirty="0" err="1"/>
+              <a:t>Doersch</a:t>
+            </a:r>
+            <a:r>
+              <a:rPr lang="en-US" sz="1800" dirty="0"/>
+              <a:t> 2016]</a:t>
             </a:r>
           </a:p>
         </p:txBody>
@@ -17154,8 +17725,8 @@
           </a:p>
         </p:txBody>
       </p:sp>
-      <mc:AlternateContent xmlns:mc="http://schemas.openxmlformats.org/markup-compatibility/2006">
-        <mc:Choice xmlns:a14="http://schemas.microsoft.com/office/drawing/2010/main" Requires="a14">
+      <mc:AlternateContent xmlns:mc="http://schemas.openxmlformats.org/markup-compatibility/2006" xmlns:a14="http://schemas.microsoft.com/office/drawing/2010/main">
+        <mc:Choice Requires="a14">
           <p:sp>
             <p:nvSpPr>
               <p:cNvPr id="3" name="Content Placeholder 2">
@@ -17525,7 +18096,7 @@
             </p:txBody>
           </p:sp>
         </mc:Choice>
-        <mc:Fallback>
+        <mc:Fallback xmlns="">
           <p:sp>
             <p:nvSpPr>
               <p:cNvPr id="3" name="Content Placeholder 2">

</xml_diff>